<commit_message>
Edit class diagram and minor tweaks for setting PPP
</commit_message>
<xml_diff>
--- a/docs/diagrams/StorageComponentClassDiagram.pptx
+++ b/docs/diagrams/StorageComponentClassDiagram.pptx
@@ -5676,8 +5676,8 @@
         </p:nvSpPr>
         <p:spPr>
           <a:xfrm>
-            <a:off x="7944132" y="4833735"/>
-            <a:ext cx="1434246" cy="346760"/>
+            <a:off x="7835610" y="4833735"/>
+            <a:ext cx="1651290" cy="346760"/>
           </a:xfrm>
           <a:prstGeom prst="rect">
             <a:avLst/>

</xml_diff>